<commit_message>
added comparison table to report and slide
</commit_message>
<xml_diff>
--- a/Project1Slides.pptx
+++ b/Project1Slides.pptx
@@ -3792,7 +3792,7 @@
   </p:txStyles>
   <p:extLst>
     <p:ext uri="{27BBF7A9-308A-43DC-89C8-2F10F3537804}">
-      <p15:sldGuideLst xmlns:p15="http://schemas.microsoft.com/office/powerpoint/2012/main"/>
+      <p15:sldGuideLst xmlns:p15="http://schemas.microsoft.com/office/powerpoint/2012/main" xmlns=""/>
     </p:ext>
   </p:extLst>
 </p:sldMaster>
@@ -4542,25 +4542,36 @@
           </a:p>
         </p:txBody>
       </p:sp>
-      <p:sp>
-        <p:nvSpPr>
-          <p:cNvPr id="3" name="Content Placeholder 2"/>
-          <p:cNvSpPr>
-            <a:spLocks noGrp="1"/>
-          </p:cNvSpPr>
-          <p:nvPr>
-            <p:ph idx="1"/>
-          </p:nvPr>
-        </p:nvSpPr>
-        <p:spPr/>
-        <p:txBody>
-          <a:bodyPr/>
-          <a:lstStyle/>
-          <a:p>
-            <a:endParaRPr lang="en-US"/>
-          </a:p>
-        </p:txBody>
-      </p:sp>
+      <p:pic>
+        <p:nvPicPr>
+          <p:cNvPr id="5" name="Picture 4" descr="Screenshot 2018-02-19 11.20.29.png"/>
+          <p:cNvPicPr>
+            <a:picLocks noChangeAspect="1"/>
+          </p:cNvPicPr>
+          <p:nvPr/>
+        </p:nvPicPr>
+        <p:blipFill>
+          <a:blip r:embed="rId2">
+            <a:extLst>
+              <a:ext uri="{28A0092B-C50C-407E-A947-70E740481C1C}">
+                <a14:useLocalDpi xmlns:a14="http://schemas.microsoft.com/office/drawing/2010/main" val="0"/>
+              </a:ext>
+            </a:extLst>
+          </a:blip>
+          <a:stretch>
+            <a:fillRect/>
+          </a:stretch>
+        </p:blipFill>
+        <p:spPr>
+          <a:xfrm>
+            <a:off x="127000" y="3023115"/>
+            <a:ext cx="11925300" cy="2286000"/>
+          </a:xfrm>
+          <a:prstGeom prst="rect">
+            <a:avLst/>
+          </a:prstGeom>
+        </p:spPr>
+      </p:pic>
     </p:spTree>
     <p:extLst>
       <p:ext uri="{BB962C8B-B14F-4D97-AF65-F5344CB8AC3E}">
@@ -4617,7 +4628,7 @@
     </a:clrScheme>
     <a:fontScheme name="Retrospect">
       <a:majorFont>
-        <a:latin typeface="Calibri Light" panose="020F0302020204030204"/>
+        <a:latin typeface="Calibri Light"/>
         <a:ea typeface=""/>
         <a:cs typeface=""/>
         <a:font script="Jpan" typeface="ＭＳ Ｐゴシック"/>
@@ -4652,7 +4663,7 @@
         <a:font script="Geor" typeface="Sylfaen"/>
       </a:majorFont>
       <a:minorFont>
-        <a:latin typeface="Calibri" panose="020F0502020204030204"/>
+        <a:latin typeface="Calibri"/>
         <a:ea typeface=""/>
         <a:cs typeface=""/>
         <a:font script="Jpan" typeface="ＭＳ Ｐゴシック"/>
@@ -4851,7 +4862,7 @@
   <a:extraClrSchemeLst/>
   <a:extLst>
     <a:ext uri="{05A4C25C-085E-4340-85A3-A5531E510DB2}">
-      <thm15:themeFamily xmlns:thm15="http://schemas.microsoft.com/office/thememl/2012/main" name="Retrospect" id="{5F128B03-DCCA-4EEB-AB3B-CF2899314A46}" vid="{3F1AAB62-24C6-49D2-8E01-B56FAC9A3DCD}"/>
+      <thm15:themeFamily xmlns:thm15="http://schemas.microsoft.com/office/thememl/2012/main" xmlns="" name="Retrospect" id="{5F128B03-DCCA-4EEB-AB3B-CF2899314A46}" vid="{3F1AAB62-24C6-49D2-8E01-B56FAC9A3DCD}"/>
     </a:ext>
   </a:extLst>
 </a:theme>

</xml_diff>